<commit_message>
VVV covar model implementation and example
</commit_message>
<xml_diff>
--- a/output/slides/slides_5-22.pptx
+++ b/output/slides/slides_5-22.pptx
@@ -11,6 +11,8 @@
     <p:sldId id="273" r:id="rId5"/>
     <p:sldId id="274" r:id="rId6"/>
     <p:sldId id="271" r:id="rId7"/>
+    <p:sldId id="276" r:id="rId8"/>
+    <p:sldId id="277" r:id="rId9"/>
   </p:sldIdLst>
   <p:sldSz cx="12192000" cy="6858000"/>
   <p:notesSz cx="6858000" cy="9144000"/>
@@ -264,7 +266,7 @@
           <a:p>
             <a:fld id="{DCED4EF7-E92F-427F-AFC0-C6538CB0B4B0}" type="datetimeFigureOut">
               <a:rPr lang="en-US" smtClean="0"/>
-              <a:t>5/20/2020</a:t>
+              <a:t>5/22/2020</a:t>
             </a:fld>
             <a:endParaRPr lang="en-US"/>
           </a:p>
@@ -462,7 +464,7 @@
           <a:p>
             <a:fld id="{DCED4EF7-E92F-427F-AFC0-C6538CB0B4B0}" type="datetimeFigureOut">
               <a:rPr lang="en-US" smtClean="0"/>
-              <a:t>5/20/2020</a:t>
+              <a:t>5/22/2020</a:t>
             </a:fld>
             <a:endParaRPr lang="en-US"/>
           </a:p>
@@ -670,7 +672,7 @@
           <a:p>
             <a:fld id="{DCED4EF7-E92F-427F-AFC0-C6538CB0B4B0}" type="datetimeFigureOut">
               <a:rPr lang="en-US" smtClean="0"/>
-              <a:t>5/20/2020</a:t>
+              <a:t>5/22/2020</a:t>
             </a:fld>
             <a:endParaRPr lang="en-US"/>
           </a:p>
@@ -868,7 +870,7 @@
           <a:p>
             <a:fld id="{DCED4EF7-E92F-427F-AFC0-C6538CB0B4B0}" type="datetimeFigureOut">
               <a:rPr lang="en-US" smtClean="0"/>
-              <a:t>5/20/2020</a:t>
+              <a:t>5/22/2020</a:t>
             </a:fld>
             <a:endParaRPr lang="en-US"/>
           </a:p>
@@ -1143,7 +1145,7 @@
           <a:p>
             <a:fld id="{DCED4EF7-E92F-427F-AFC0-C6538CB0B4B0}" type="datetimeFigureOut">
               <a:rPr lang="en-US" smtClean="0"/>
-              <a:t>5/20/2020</a:t>
+              <a:t>5/22/2020</a:t>
             </a:fld>
             <a:endParaRPr lang="en-US"/>
           </a:p>
@@ -1408,7 +1410,7 @@
           <a:p>
             <a:fld id="{DCED4EF7-E92F-427F-AFC0-C6538CB0B4B0}" type="datetimeFigureOut">
               <a:rPr lang="en-US" smtClean="0"/>
-              <a:t>5/20/2020</a:t>
+              <a:t>5/22/2020</a:t>
             </a:fld>
             <a:endParaRPr lang="en-US"/>
           </a:p>
@@ -1820,7 +1822,7 @@
           <a:p>
             <a:fld id="{DCED4EF7-E92F-427F-AFC0-C6538CB0B4B0}" type="datetimeFigureOut">
               <a:rPr lang="en-US" smtClean="0"/>
-              <a:t>5/20/2020</a:t>
+              <a:t>5/22/2020</a:t>
             </a:fld>
             <a:endParaRPr lang="en-US"/>
           </a:p>
@@ -1961,7 +1963,7 @@
           <a:p>
             <a:fld id="{DCED4EF7-E92F-427F-AFC0-C6538CB0B4B0}" type="datetimeFigureOut">
               <a:rPr lang="en-US" smtClean="0"/>
-              <a:t>5/20/2020</a:t>
+              <a:t>5/22/2020</a:t>
             </a:fld>
             <a:endParaRPr lang="en-US"/>
           </a:p>
@@ -2074,7 +2076,7 @@
           <a:p>
             <a:fld id="{DCED4EF7-E92F-427F-AFC0-C6538CB0B4B0}" type="datetimeFigureOut">
               <a:rPr lang="en-US" smtClean="0"/>
-              <a:t>5/20/2020</a:t>
+              <a:t>5/22/2020</a:t>
             </a:fld>
             <a:endParaRPr lang="en-US"/>
           </a:p>
@@ -2385,7 +2387,7 @@
           <a:p>
             <a:fld id="{DCED4EF7-E92F-427F-AFC0-C6538CB0B4B0}" type="datetimeFigureOut">
               <a:rPr lang="en-US" smtClean="0"/>
-              <a:t>5/20/2020</a:t>
+              <a:t>5/22/2020</a:t>
             </a:fld>
             <a:endParaRPr lang="en-US"/>
           </a:p>
@@ -2673,7 +2675,7 @@
           <a:p>
             <a:fld id="{DCED4EF7-E92F-427F-AFC0-C6538CB0B4B0}" type="datetimeFigureOut">
               <a:rPr lang="en-US" smtClean="0"/>
-              <a:t>5/20/2020</a:t>
+              <a:t>5/22/2020</a:t>
             </a:fld>
             <a:endParaRPr lang="en-US"/>
           </a:p>
@@ -2914,7 +2916,7 @@
           <a:p>
             <a:fld id="{DCED4EF7-E92F-427F-AFC0-C6538CB0B4B0}" type="datetimeFigureOut">
               <a:rPr lang="en-US" smtClean="0"/>
-              <a:t>5/20/2020</a:t>
+              <a:t>5/22/2020</a:t>
             </a:fld>
             <a:endParaRPr lang="en-US"/>
           </a:p>
@@ -3354,7 +3356,7 @@
           <a:p>
             <a:r>
               <a:rPr lang="en-US" dirty="0"/>
-              <a:t>Update</a:t>
+              <a:t>Spatial Update</a:t>
             </a:r>
           </a:p>
         </p:txBody>
@@ -3664,53 +3666,24 @@
                         </a:rPr>
                         <m:t>,</m:t>
                       </m:r>
-                      <m:f>
-                        <m:fPr>
+                      <m:d>
+                        <m:dPr>
                           <m:ctrlPr>
-                            <a:rPr lang="en-US" i="1">
+                            <a:rPr lang="en-US" b="0" i="1" smtClean="0">
                               <a:latin typeface="Cambria Math" panose="02040503050406030204" pitchFamily="18" charset="0"/>
                             </a:rPr>
                           </m:ctrlPr>
-                        </m:fPr>
-                        <m:num>
-                          <m:sSub>
-                            <m:sSubPr>
+                        </m:dPr>
+                        <m:e>
+                          <m:f>
+                            <m:fPr>
                               <m:ctrlPr>
-                                <a:rPr lang="en-US" i="1">
+                                <a:rPr lang="en-US" i="1" smtClean="0">
                                   <a:latin typeface="Cambria Math" panose="02040503050406030204" pitchFamily="18" charset="0"/>
                                 </a:rPr>
                               </m:ctrlPr>
-                            </m:sSubPr>
-                            <m:e>
-                              <m:r>
-                                <a:rPr lang="en-US" b="1" i="1">
-                                  <a:latin typeface="Cambria Math" panose="02040503050406030204" pitchFamily="18" charset="0"/>
-                                </a:rPr>
-                                <m:t>𝝐</m:t>
-                              </m:r>
-                            </m:e>
-                            <m:sub>
-                              <m:r>
-                                <a:rPr lang="en-US" i="1">
-                                  <a:latin typeface="Cambria Math" panose="02040503050406030204" pitchFamily="18" charset="0"/>
-                                </a:rPr>
-                                <m:t>𝑖</m:t>
-                              </m:r>
-                            </m:sub>
-                          </m:sSub>
-                        </m:num>
-                        <m:den>
-                          <m:rad>
-                            <m:radPr>
-                              <m:degHide m:val="on"/>
-                              <m:ctrlPr>
-                                <a:rPr lang="en-US" i="1">
-                                  <a:latin typeface="Cambria Math" panose="02040503050406030204" pitchFamily="18" charset="0"/>
-                                </a:rPr>
-                              </m:ctrlPr>
-                            </m:radPr>
-                            <m:deg/>
-                            <m:e>
+                            </m:fPr>
+                            <m:num>
                               <m:sSub>
                                 <m:sSubPr>
                                   <m:ctrlPr>
@@ -3721,10 +3694,10 @@
                                 </m:sSubPr>
                                 <m:e>
                                   <m:r>
-                                    <a:rPr lang="en-US" i="1">
+                                    <a:rPr lang="en-US" b="1" i="1">
                                       <a:latin typeface="Cambria Math" panose="02040503050406030204" pitchFamily="18" charset="0"/>
                                     </a:rPr>
-                                    <m:t>𝑤</m:t>
+                                    <m:t>𝝐</m:t>
                                   </m:r>
                                 </m:e>
                                 <m:sub>
@@ -3736,10 +3709,77 @@
                                   </m:r>
                                 </m:sub>
                               </m:sSub>
+                            </m:num>
+                            <m:den>
+                              <m:rad>
+                                <m:radPr>
+                                  <m:degHide m:val="on"/>
+                                  <m:ctrlPr>
+                                    <a:rPr lang="en-US" i="1">
+                                      <a:latin typeface="Cambria Math" panose="02040503050406030204" pitchFamily="18" charset="0"/>
+                                    </a:rPr>
+                                  </m:ctrlPr>
+                                </m:radPr>
+                                <m:deg/>
+                                <m:e>
+                                  <m:sSub>
+                                    <m:sSubPr>
+                                      <m:ctrlPr>
+                                        <a:rPr lang="en-US" i="1">
+                                          <a:latin typeface="Cambria Math" panose="02040503050406030204" pitchFamily="18" charset="0"/>
+                                        </a:rPr>
+                                      </m:ctrlPr>
+                                    </m:sSubPr>
+                                    <m:e>
+                                      <m:r>
+                                        <a:rPr lang="en-US" i="1">
+                                          <a:latin typeface="Cambria Math" panose="02040503050406030204" pitchFamily="18" charset="0"/>
+                                        </a:rPr>
+                                        <m:t>𝑤</m:t>
+                                      </m:r>
+                                    </m:e>
+                                    <m:sub>
+                                      <m:r>
+                                        <a:rPr lang="en-US" i="1">
+                                          <a:latin typeface="Cambria Math" panose="02040503050406030204" pitchFamily="18" charset="0"/>
+                                        </a:rPr>
+                                        <m:t>𝑖</m:t>
+                                      </m:r>
+                                    </m:sub>
+                                  </m:sSub>
+                                </m:e>
+                              </m:rad>
+                            </m:den>
+                          </m:f>
+                        </m:e>
+                        <m:e>
+                          <m:sSub>
+                            <m:sSubPr>
+                              <m:ctrlPr>
+                                <a:rPr lang="en-US" b="0" i="1" smtClean="0">
+                                  <a:latin typeface="Cambria Math" panose="02040503050406030204" pitchFamily="18" charset="0"/>
+                                </a:rPr>
+                              </m:ctrlPr>
+                            </m:sSubPr>
+                            <m:e>
+                              <m:r>
+                                <a:rPr lang="en-US" b="0" i="1" smtClean="0">
+                                  <a:latin typeface="Cambria Math" panose="02040503050406030204" pitchFamily="18" charset="0"/>
+                                </a:rPr>
+                                <m:t>𝑤</m:t>
+                              </m:r>
                             </m:e>
-                          </m:rad>
-                        </m:den>
-                      </m:f>
+                            <m:sub>
+                              <m:r>
+                                <a:rPr lang="en-US" b="0" i="1" smtClean="0">
+                                  <a:latin typeface="Cambria Math" panose="02040503050406030204" pitchFamily="18" charset="0"/>
+                                </a:rPr>
+                                <m:t>𝑖</m:t>
+                              </m:r>
+                            </m:sub>
+                          </m:sSub>
+                        </m:e>
+                      </m:d>
                       <m:r>
                         <a:rPr lang="en-US" i="1">
                           <a:latin typeface="Cambria Math" panose="02040503050406030204" pitchFamily="18" charset="0"/>
@@ -4502,7 +4542,7 @@
                     <m:d>
                       <m:dPr>
                         <m:ctrlPr>
-                          <a:rPr lang="en-US" b="0" i="0" smtClean="0">
+                          <a:rPr lang="en-US" b="0" i="1" smtClean="0">
                             <a:latin typeface="Cambria Math" panose="02040503050406030204" pitchFamily="18" charset="0"/>
                           </a:rPr>
                         </m:ctrlPr>
@@ -5015,16 +5055,7 @@
                       <a:rPr lang="en-US">
                         <a:latin typeface="Cambria Math" panose="02040503050406030204" pitchFamily="18" charset="0"/>
                       </a:rPr>
-                      <m:t>ex</m:t>
-                    </m:r>
-                    <m:r>
-                      <m:rPr>
-                        <m:sty m:val="p"/>
-                      </m:rPr>
-                      <a:rPr lang="en-US">
-                        <a:latin typeface="Cambria Math" panose="02040503050406030204" pitchFamily="18" charset="0"/>
-                      </a:rPr>
-                      <m:t>p</m:t>
+                      <m:t>exp</m:t>
                     </m:r>
                     <m:d>
                       <m:dPr>
@@ -5989,8 +6020,8 @@
           </a:p>
         </p:txBody>
       </p:sp>
-      <mc:AlternateContent xmlns:mc="http://schemas.openxmlformats.org/markup-compatibility/2006">
-        <mc:Choice xmlns:a14="http://schemas.microsoft.com/office/drawing/2010/main" Requires="a14">
+      <mc:AlternateContent xmlns:mc="http://schemas.openxmlformats.org/markup-compatibility/2006" xmlns:a14="http://schemas.microsoft.com/office/drawing/2010/main">
+        <mc:Choice Requires="a14">
           <p:sp>
             <p:nvSpPr>
               <p:cNvPr id="9" name="Content Placeholder 8">
@@ -7731,7 +7762,7 @@
             </p:txBody>
           </p:sp>
         </mc:Choice>
-        <mc:Fallback>
+        <mc:Fallback xmlns="">
           <p:sp>
             <p:nvSpPr>
               <p:cNvPr id="9" name="Content Placeholder 8">
@@ -7775,8 +7806,8 @@
           </p:sp>
         </mc:Fallback>
       </mc:AlternateContent>
-      <mc:AlternateContent xmlns:mc="http://schemas.openxmlformats.org/markup-compatibility/2006">
-        <mc:Choice xmlns:a14="http://schemas.microsoft.com/office/drawing/2010/main" Requires="a14">
+      <mc:AlternateContent xmlns:mc="http://schemas.openxmlformats.org/markup-compatibility/2006" xmlns:a14="http://schemas.microsoft.com/office/drawing/2010/main">
+        <mc:Choice Requires="a14">
           <p:sp>
             <p:nvSpPr>
               <p:cNvPr id="2" name="Content Placeholder 1">
@@ -9863,16 +9894,7 @@
                           </a:solidFill>
                           <a:latin typeface="Cambria Math" panose="02040503050406030204" pitchFamily="18" charset="0"/>
                         </a:rPr>
-                        <m:t> </m:t>
-                      </m:r>
-                      <m:r>
-                        <a:rPr lang="en-US" sz="1000" i="1">
-                          <a:solidFill>
-                            <a:srgbClr val="FF0000"/>
-                          </a:solidFill>
-                          <a:latin typeface="Cambria Math" panose="02040503050406030204" pitchFamily="18" charset="0"/>
-                        </a:rPr>
-                        <m:t>~</m:t>
+                        <m:t> ~</m:t>
                       </m:r>
                       <m:r>
                         <m:rPr>
@@ -10548,7 +10570,7 @@
             </p:txBody>
           </p:sp>
         </mc:Choice>
-        <mc:Fallback>
+        <mc:Fallback xmlns="">
           <p:sp>
             <p:nvSpPr>
               <p:cNvPr id="2" name="Content Placeholder 1">
@@ -10887,7 +10909,7 @@
             <p:ph idx="1"/>
             <p:extLst>
               <p:ext uri="{D42A27DB-BD31-4B8C-83A1-F6EECF244321}">
-                <p14:modId xmlns:p14="http://schemas.microsoft.com/office/powerpoint/2010/main" val="4158816787"/>
+                <p14:modId xmlns:p14="http://schemas.microsoft.com/office/powerpoint/2010/main" val="1062519582"/>
               </p:ext>
             </p:extLst>
           </p:nvPr>
@@ -11144,7 +11166,11 @@
                       </a:r>
                     </a:p>
                   </a:txBody>
-                  <a:tcPr/>
+                  <a:tcPr>
+                    <a:solidFill>
+                      <a:srgbClr val="FFC000"/>
+                    </a:solidFill>
+                  </a:tcPr>
                 </a:tc>
                 <a:tc>
                   <a:txBody>
@@ -11162,7 +11188,13 @@
                       </a:r>
                     </a:p>
                   </a:txBody>
-                  <a:tcPr/>
+                  <a:tcPr>
+                    <a:solidFill>
+                      <a:srgbClr val="FFC000">
+                        <a:alpha val="28000"/>
+                      </a:srgbClr>
+                    </a:solidFill>
+                  </a:tcPr>
                 </a:tc>
                 <a:tc>
                   <a:txBody>
@@ -11180,7 +11212,13 @@
                       </a:r>
                     </a:p>
                   </a:txBody>
-                  <a:tcPr/>
+                  <a:tcPr>
+                    <a:solidFill>
+                      <a:srgbClr val="FFC000">
+                        <a:alpha val="48000"/>
+                      </a:srgbClr>
+                    </a:solidFill>
+                  </a:tcPr>
                 </a:tc>
                 <a:tc>
                   <a:txBody>
@@ -11198,7 +11236,13 @@
                       </a:r>
                     </a:p>
                   </a:txBody>
-                  <a:tcPr/>
+                  <a:tcPr>
+                    <a:solidFill>
+                      <a:srgbClr val="FFC000">
+                        <a:alpha val="48000"/>
+                      </a:srgbClr>
+                    </a:solidFill>
+                  </a:tcPr>
                 </a:tc>
                 <a:tc>
                   <a:txBody>
@@ -11216,7 +11260,13 @@
                       </a:r>
                     </a:p>
                   </a:txBody>
-                  <a:tcPr/>
+                  <a:tcPr>
+                    <a:solidFill>
+                      <a:srgbClr val="FFC000">
+                        <a:alpha val="48000"/>
+                      </a:srgbClr>
+                    </a:solidFill>
+                  </a:tcPr>
                 </a:tc>
                 <a:tc>
                   <a:txBody>
@@ -11234,7 +11284,13 @@
                       </a:r>
                     </a:p>
                   </a:txBody>
-                  <a:tcPr/>
+                  <a:tcPr>
+                    <a:solidFill>
+                      <a:srgbClr val="FFC000">
+                        <a:alpha val="48000"/>
+                      </a:srgbClr>
+                    </a:solidFill>
+                  </a:tcPr>
                 </a:tc>
                 <a:extLst>
                   <a:ext uri="{0D108BD9-81ED-4DB2-BD59-A6C34878D82A}">
@@ -11285,7 +11341,11 @@
                       </a:r>
                     </a:p>
                   </a:txBody>
-                  <a:tcPr/>
+                  <a:tcPr>
+                    <a:solidFill>
+                      <a:srgbClr val="FFC000"/>
+                    </a:solidFill>
+                  </a:tcPr>
                 </a:tc>
                 <a:tc>
                   <a:txBody>
@@ -11299,7 +11359,13 @@
                       </a:r>
                     </a:p>
                   </a:txBody>
-                  <a:tcPr/>
+                  <a:tcPr>
+                    <a:solidFill>
+                      <a:srgbClr val="FFC000">
+                        <a:alpha val="46000"/>
+                      </a:srgbClr>
+                    </a:solidFill>
+                  </a:tcPr>
                 </a:tc>
                 <a:tc>
                   <a:txBody>
@@ -11313,7 +11379,13 @@
                       </a:r>
                     </a:p>
                   </a:txBody>
-                  <a:tcPr/>
+                  <a:tcPr>
+                    <a:solidFill>
+                      <a:srgbClr val="FFC000">
+                        <a:alpha val="46000"/>
+                      </a:srgbClr>
+                    </a:solidFill>
+                  </a:tcPr>
                 </a:tc>
                 <a:tc>
                   <a:txBody>
@@ -11327,7 +11399,13 @@
                       </a:r>
                     </a:p>
                   </a:txBody>
-                  <a:tcPr/>
+                  <a:tcPr>
+                    <a:solidFill>
+                      <a:srgbClr val="FFC000">
+                        <a:alpha val="46000"/>
+                      </a:srgbClr>
+                    </a:solidFill>
+                  </a:tcPr>
                 </a:tc>
                 <a:tc>
                   <a:txBody>
@@ -11345,7 +11423,13 @@
                       </a:r>
                     </a:p>
                   </a:txBody>
-                  <a:tcPr/>
+                  <a:tcPr>
+                    <a:solidFill>
+                      <a:srgbClr val="FFC000">
+                        <a:alpha val="46000"/>
+                      </a:srgbClr>
+                    </a:solidFill>
+                  </a:tcPr>
                 </a:tc>
                 <a:extLst>
                   <a:ext uri="{0D108BD9-81ED-4DB2-BD59-A6C34878D82A}">
@@ -11422,7 +11506,11 @@
                       </a:r>
                     </a:p>
                   </a:txBody>
-                  <a:tcPr/>
+                  <a:tcPr>
+                    <a:solidFill>
+                      <a:srgbClr val="FFC000"/>
+                    </a:solidFill>
+                  </a:tcPr>
                 </a:tc>
                 <a:tc>
                   <a:txBody>
@@ -11436,7 +11524,13 @@
                       </a:r>
                     </a:p>
                   </a:txBody>
-                  <a:tcPr/>
+                  <a:tcPr>
+                    <a:solidFill>
+                      <a:srgbClr val="FFC000">
+                        <a:alpha val="98000"/>
+                      </a:srgbClr>
+                    </a:solidFill>
+                  </a:tcPr>
                 </a:tc>
                 <a:tc>
                   <a:txBody>
@@ -11450,7 +11544,13 @@
                       </a:r>
                     </a:p>
                   </a:txBody>
-                  <a:tcPr/>
+                  <a:tcPr>
+                    <a:solidFill>
+                      <a:srgbClr val="FFC000">
+                        <a:alpha val="96000"/>
+                      </a:srgbClr>
+                    </a:solidFill>
+                  </a:tcPr>
                 </a:tc>
                 <a:tc>
                   <a:txBody>
@@ -11468,7 +11568,13 @@
                       </a:r>
                     </a:p>
                   </a:txBody>
-                  <a:tcPr/>
+                  <a:tcPr>
+                    <a:solidFill>
+                      <a:srgbClr val="FFC000">
+                        <a:alpha val="97000"/>
+                      </a:srgbClr>
+                    </a:solidFill>
+                  </a:tcPr>
                 </a:tc>
                 <a:extLst>
                   <a:ext uri="{0D108BD9-81ED-4DB2-BD59-A6C34878D82A}">
@@ -11556,7 +11662,11 @@
                       </a:r>
                     </a:p>
                   </a:txBody>
-                  <a:tcPr/>
+                  <a:tcPr>
+                    <a:solidFill>
+                      <a:srgbClr val="FFC000"/>
+                    </a:solidFill>
+                  </a:tcPr>
                 </a:tc>
                 <a:tc>
                   <a:txBody>
@@ -11570,7 +11680,13 @@
                       </a:r>
                     </a:p>
                   </a:txBody>
-                  <a:tcPr/>
+                  <a:tcPr>
+                    <a:solidFill>
+                      <a:srgbClr val="FFC000">
+                        <a:alpha val="97000"/>
+                      </a:srgbClr>
+                    </a:solidFill>
+                  </a:tcPr>
                 </a:tc>
                 <a:tc>
                   <a:txBody>
@@ -11588,7 +11704,13 @@
                       </a:r>
                     </a:p>
                   </a:txBody>
-                  <a:tcPr/>
+                  <a:tcPr>
+                    <a:solidFill>
+                      <a:srgbClr val="FFC000">
+                        <a:alpha val="98000"/>
+                      </a:srgbClr>
+                    </a:solidFill>
+                  </a:tcPr>
                 </a:tc>
                 <a:extLst>
                   <a:ext uri="{0D108BD9-81ED-4DB2-BD59-A6C34878D82A}">
@@ -11687,7 +11809,11 @@
                       </a:r>
                     </a:p>
                   </a:txBody>
-                  <a:tcPr/>
+                  <a:tcPr>
+                    <a:solidFill>
+                      <a:srgbClr val="FFC000"/>
+                    </a:solidFill>
+                  </a:tcPr>
                 </a:tc>
                 <a:tc>
                   <a:txBody>
@@ -11705,7 +11831,13 @@
                       </a:r>
                     </a:p>
                   </a:txBody>
-                  <a:tcPr/>
+                  <a:tcPr>
+                    <a:solidFill>
+                      <a:srgbClr val="FFC000">
+                        <a:alpha val="98000"/>
+                      </a:srgbClr>
+                    </a:solidFill>
+                  </a:tcPr>
                 </a:tc>
                 <a:extLst>
                   <a:ext uri="{0D108BD9-81ED-4DB2-BD59-A6C34878D82A}">
@@ -11815,7 +11947,11 @@
                       </a:r>
                     </a:p>
                   </a:txBody>
-                  <a:tcPr/>
+                  <a:tcPr>
+                    <a:solidFill>
+                      <a:srgbClr val="FFC000"/>
+                    </a:solidFill>
+                  </a:tcPr>
                 </a:tc>
                 <a:extLst>
                   <a:ext uri="{0D108BD9-81ED-4DB2-BD59-A6C34878D82A}">
@@ -13188,6 +13324,412 @@
 </p:sld>
 </file>
 
+<file path=ppt/slides/slide7.xml><?xml version="1.0" encoding="utf-8"?>
+<p:sld xmlns:a="http://schemas.openxmlformats.org/drawingml/2006/main" xmlns:r="http://schemas.openxmlformats.org/officeDocument/2006/relationships" xmlns:p="http://schemas.openxmlformats.org/presentationml/2006/main">
+  <p:cSld>
+    <p:spTree>
+      <p:nvGrpSpPr>
+        <p:cNvPr id="1" name=""/>
+        <p:cNvGrpSpPr/>
+        <p:nvPr/>
+      </p:nvGrpSpPr>
+      <p:grpSpPr>
+        <a:xfrm>
+          <a:off x="0" y="0"/>
+          <a:ext cx="0" cy="0"/>
+          <a:chOff x="0" y="0"/>
+          <a:chExt cx="0" cy="0"/>
+        </a:xfrm>
+      </p:grpSpPr>
+      <p:sp>
+        <p:nvSpPr>
+          <p:cNvPr id="2" name="Title 1">
+            <a:extLst>
+              <a:ext uri="{FF2B5EF4-FFF2-40B4-BE49-F238E27FC236}">
+                <a16:creationId xmlns:a16="http://schemas.microsoft.com/office/drawing/2014/main" id="{11D7AB3A-06A4-4875-9897-EF3F74CB2B8C}"/>
+              </a:ext>
+            </a:extLst>
+          </p:cNvPr>
+          <p:cNvSpPr>
+            <a:spLocks noGrp="1"/>
+          </p:cNvSpPr>
+          <p:nvPr>
+            <p:ph type="title"/>
+          </p:nvPr>
+        </p:nvSpPr>
+        <p:spPr/>
+        <p:txBody>
+          <a:bodyPr>
+            <a:normAutofit/>
+          </a:bodyPr>
+          <a:lstStyle/>
+          <a:p>
+            <a:r>
+              <a:rPr lang="en-US" sz="3200" dirty="0"/>
+              <a:t>EEE Gaussian model (left) vs. VVV Gaussian model (right)</a:t>
+            </a:r>
+          </a:p>
+        </p:txBody>
+      </p:sp>
+      <p:sp>
+        <p:nvSpPr>
+          <p:cNvPr id="10" name="TextBox 9">
+            <a:extLst>
+              <a:ext uri="{FF2B5EF4-FFF2-40B4-BE49-F238E27FC236}">
+                <a16:creationId xmlns:a16="http://schemas.microsoft.com/office/drawing/2014/main" id="{7DA507AE-A81D-45CB-80E7-FEFE2078FA2A}"/>
+              </a:ext>
+            </a:extLst>
+          </p:cNvPr>
+          <p:cNvSpPr txBox="1"/>
+          <p:nvPr/>
+        </p:nvSpPr>
+        <p:spPr>
+          <a:xfrm>
+            <a:off x="2031517" y="6123543"/>
+            <a:ext cx="2247731" cy="369332"/>
+          </a:xfrm>
+          <a:prstGeom prst="rect">
+            <a:avLst/>
+          </a:prstGeom>
+          <a:noFill/>
+        </p:spPr>
+        <p:txBody>
+          <a:bodyPr wrap="none" rtlCol="0">
+            <a:spAutoFit/>
+          </a:bodyPr>
+          <a:lstStyle/>
+          <a:p>
+            <a:pPr algn="ctr"/>
+            <a:r>
+              <a:rPr lang="en-US" dirty="0"/>
+              <a:t>ARI with truth = 0.469</a:t>
+            </a:r>
+          </a:p>
+        </p:txBody>
+      </p:sp>
+      <p:sp>
+        <p:nvSpPr>
+          <p:cNvPr id="11" name="TextBox 10">
+            <a:extLst>
+              <a:ext uri="{FF2B5EF4-FFF2-40B4-BE49-F238E27FC236}">
+                <a16:creationId xmlns:a16="http://schemas.microsoft.com/office/drawing/2014/main" id="{3BF28DA8-A42B-48DE-9F68-99A31BEDE780}"/>
+              </a:ext>
+            </a:extLst>
+          </p:cNvPr>
+          <p:cNvSpPr txBox="1"/>
+          <p:nvPr/>
+        </p:nvSpPr>
+        <p:spPr>
+          <a:xfrm>
+            <a:off x="7912755" y="6123543"/>
+            <a:ext cx="2247730" cy="369332"/>
+          </a:xfrm>
+          <a:prstGeom prst="rect">
+            <a:avLst/>
+          </a:prstGeom>
+          <a:noFill/>
+        </p:spPr>
+        <p:txBody>
+          <a:bodyPr wrap="none" rtlCol="0">
+            <a:spAutoFit/>
+          </a:bodyPr>
+          <a:lstStyle/>
+          <a:p>
+            <a:pPr algn="ctr"/>
+            <a:r>
+              <a:rPr lang="en-US" dirty="0"/>
+              <a:t>ARI with truth = 0.349</a:t>
+            </a:r>
+          </a:p>
+        </p:txBody>
+      </p:sp>
+      <p:sp>
+        <p:nvSpPr>
+          <p:cNvPr id="12" name="TextBox 11">
+            <a:extLst>
+              <a:ext uri="{FF2B5EF4-FFF2-40B4-BE49-F238E27FC236}">
+                <a16:creationId xmlns:a16="http://schemas.microsoft.com/office/drawing/2014/main" id="{5FD3E3FE-2D99-44EC-9B7F-892596B175EE}"/>
+              </a:ext>
+            </a:extLst>
+          </p:cNvPr>
+          <p:cNvSpPr txBox="1"/>
+          <p:nvPr/>
+        </p:nvSpPr>
+        <p:spPr>
+          <a:xfrm>
+            <a:off x="4929945" y="6311900"/>
+            <a:ext cx="2332113" cy="369332"/>
+          </a:xfrm>
+          <a:prstGeom prst="rect">
+            <a:avLst/>
+          </a:prstGeom>
+          <a:noFill/>
+        </p:spPr>
+        <p:txBody>
+          <a:bodyPr wrap="none" rtlCol="0">
+            <a:spAutoFit/>
+          </a:bodyPr>
+          <a:lstStyle/>
+          <a:p>
+            <a:pPr algn="ctr"/>
+            <a:r>
+              <a:rPr lang="en-US" dirty="0"/>
+              <a:t>ARI EEE vs VVV = 0.430</a:t>
+            </a:r>
+          </a:p>
+        </p:txBody>
+      </p:sp>
+      <p:pic>
+        <p:nvPicPr>
+          <p:cNvPr id="13" name="Content Placeholder 12">
+            <a:extLst>
+              <a:ext uri="{FF2B5EF4-FFF2-40B4-BE49-F238E27FC236}">
+                <a16:creationId xmlns:a16="http://schemas.microsoft.com/office/drawing/2014/main" id="{1E24812B-F1F3-404B-95B3-6FC872182DAE}"/>
+              </a:ext>
+            </a:extLst>
+          </p:cNvPr>
+          <p:cNvPicPr>
+            <a:picLocks noGrp="1" noChangeAspect="1"/>
+          </p:cNvPicPr>
+          <p:nvPr>
+            <p:ph idx="1"/>
+          </p:nvPr>
+        </p:nvPicPr>
+        <p:blipFill rotWithShape="1">
+          <a:blip r:embed="rId2"/>
+          <a:srcRect t="4625" b="3380"/>
+          <a:stretch/>
+        </p:blipFill>
+        <p:spPr>
+          <a:xfrm>
+            <a:off x="1939762" y="1825625"/>
+            <a:ext cx="8312476" cy="4351338"/>
+          </a:xfrm>
+          <a:prstGeom prst="rect">
+            <a:avLst/>
+          </a:prstGeom>
+        </p:spPr>
+      </p:pic>
+    </p:spTree>
+    <p:extLst>
+      <p:ext uri="{BB962C8B-B14F-4D97-AF65-F5344CB8AC3E}">
+        <p14:creationId xmlns:p14="http://schemas.microsoft.com/office/powerpoint/2010/main" val="1573481974"/>
+      </p:ext>
+    </p:extLst>
+  </p:cSld>
+  <p:clrMapOvr>
+    <a:masterClrMapping/>
+  </p:clrMapOvr>
+</p:sld>
+</file>
+
+<file path=ppt/slides/slide8.xml><?xml version="1.0" encoding="utf-8"?>
+<p:sld xmlns:a="http://schemas.openxmlformats.org/drawingml/2006/main" xmlns:r="http://schemas.openxmlformats.org/officeDocument/2006/relationships" xmlns:p="http://schemas.openxmlformats.org/presentationml/2006/main">
+  <p:cSld>
+    <p:spTree>
+      <p:nvGrpSpPr>
+        <p:cNvPr id="1" name=""/>
+        <p:cNvGrpSpPr/>
+        <p:nvPr/>
+      </p:nvGrpSpPr>
+      <p:grpSpPr>
+        <a:xfrm>
+          <a:off x="0" y="0"/>
+          <a:ext cx="0" cy="0"/>
+          <a:chOff x="0" y="0"/>
+          <a:chExt cx="0" cy="0"/>
+        </a:xfrm>
+      </p:grpSpPr>
+      <p:sp>
+        <p:nvSpPr>
+          <p:cNvPr id="2" name="Title 1">
+            <a:extLst>
+              <a:ext uri="{FF2B5EF4-FFF2-40B4-BE49-F238E27FC236}">
+                <a16:creationId xmlns:a16="http://schemas.microsoft.com/office/drawing/2014/main" id="{9A4134A0-43DC-4906-A6A2-EA6C0893A01A}"/>
+              </a:ext>
+            </a:extLst>
+          </p:cNvPr>
+          <p:cNvSpPr>
+            <a:spLocks noGrp="1"/>
+          </p:cNvSpPr>
+          <p:nvPr>
+            <p:ph type="title"/>
+          </p:nvPr>
+        </p:nvSpPr>
+        <p:spPr/>
+        <p:txBody>
+          <a:bodyPr>
+            <a:normAutofit/>
+          </a:bodyPr>
+          <a:lstStyle/>
+          <a:p>
+            <a:r>
+              <a:rPr lang="en-US" sz="4000" dirty="0"/>
+              <a:t>VVV Gaussian model (left) vs. VVV </a:t>
+            </a:r>
+            <a:r>
+              <a:rPr lang="en-US" sz="4000" i="1" dirty="0"/>
+              <a:t>t</a:t>
+            </a:r>
+            <a:r>
+              <a:rPr lang="en-US" sz="4000" dirty="0"/>
+              <a:t> model (right)</a:t>
+            </a:r>
+          </a:p>
+        </p:txBody>
+      </p:sp>
+      <p:sp>
+        <p:nvSpPr>
+          <p:cNvPr id="6" name="TextBox 5">
+            <a:extLst>
+              <a:ext uri="{FF2B5EF4-FFF2-40B4-BE49-F238E27FC236}">
+                <a16:creationId xmlns:a16="http://schemas.microsoft.com/office/drawing/2014/main" id="{E20BB9D9-3758-41CB-831C-4555890D8C86}"/>
+              </a:ext>
+            </a:extLst>
+          </p:cNvPr>
+          <p:cNvSpPr txBox="1"/>
+          <p:nvPr/>
+        </p:nvSpPr>
+        <p:spPr>
+          <a:xfrm>
+            <a:off x="2031517" y="6123543"/>
+            <a:ext cx="2247731" cy="369332"/>
+          </a:xfrm>
+          <a:prstGeom prst="rect">
+            <a:avLst/>
+          </a:prstGeom>
+          <a:noFill/>
+        </p:spPr>
+        <p:txBody>
+          <a:bodyPr wrap="none" rtlCol="0">
+            <a:spAutoFit/>
+          </a:bodyPr>
+          <a:lstStyle/>
+          <a:p>
+            <a:pPr algn="ctr"/>
+            <a:r>
+              <a:rPr lang="en-US" dirty="0"/>
+              <a:t>ARI with truth = 0.349</a:t>
+            </a:r>
+          </a:p>
+        </p:txBody>
+      </p:sp>
+      <p:sp>
+        <p:nvSpPr>
+          <p:cNvPr id="7" name="TextBox 6">
+            <a:extLst>
+              <a:ext uri="{FF2B5EF4-FFF2-40B4-BE49-F238E27FC236}">
+                <a16:creationId xmlns:a16="http://schemas.microsoft.com/office/drawing/2014/main" id="{183C4EFF-24CB-4E24-BA76-5F57393416C4}"/>
+              </a:ext>
+            </a:extLst>
+          </p:cNvPr>
+          <p:cNvSpPr txBox="1"/>
+          <p:nvPr/>
+        </p:nvSpPr>
+        <p:spPr>
+          <a:xfrm>
+            <a:off x="7912755" y="6123543"/>
+            <a:ext cx="2247731" cy="369332"/>
+          </a:xfrm>
+          <a:prstGeom prst="rect">
+            <a:avLst/>
+          </a:prstGeom>
+          <a:noFill/>
+        </p:spPr>
+        <p:txBody>
+          <a:bodyPr wrap="none" rtlCol="0">
+            <a:spAutoFit/>
+          </a:bodyPr>
+          <a:lstStyle/>
+          <a:p>
+            <a:pPr algn="ctr"/>
+            <a:r>
+              <a:rPr lang="en-US" dirty="0"/>
+              <a:t>ARI with truth = 0.367</a:t>
+            </a:r>
+          </a:p>
+        </p:txBody>
+      </p:sp>
+      <p:sp>
+        <p:nvSpPr>
+          <p:cNvPr id="8" name="TextBox 7">
+            <a:extLst>
+              <a:ext uri="{FF2B5EF4-FFF2-40B4-BE49-F238E27FC236}">
+                <a16:creationId xmlns:a16="http://schemas.microsoft.com/office/drawing/2014/main" id="{1CCAF4EE-49D2-49A5-8018-F3DDDD3A6E92}"/>
+              </a:ext>
+            </a:extLst>
+          </p:cNvPr>
+          <p:cNvSpPr txBox="1"/>
+          <p:nvPr/>
+        </p:nvSpPr>
+        <p:spPr>
+          <a:xfrm>
+            <a:off x="4904523" y="6311900"/>
+            <a:ext cx="2382960" cy="369332"/>
+          </a:xfrm>
+          <a:prstGeom prst="rect">
+            <a:avLst/>
+          </a:prstGeom>
+          <a:noFill/>
+        </p:spPr>
+        <p:txBody>
+          <a:bodyPr wrap="none" rtlCol="0">
+            <a:spAutoFit/>
+          </a:bodyPr>
+          <a:lstStyle/>
+          <a:p>
+            <a:pPr algn="ctr"/>
+            <a:r>
+              <a:rPr lang="en-US" dirty="0"/>
+              <a:t>ARI normal vs T = 0.898</a:t>
+            </a:r>
+          </a:p>
+        </p:txBody>
+      </p:sp>
+      <p:pic>
+        <p:nvPicPr>
+          <p:cNvPr id="13" name="Content Placeholder 12">
+            <a:extLst>
+              <a:ext uri="{FF2B5EF4-FFF2-40B4-BE49-F238E27FC236}">
+                <a16:creationId xmlns:a16="http://schemas.microsoft.com/office/drawing/2014/main" id="{7DA516CF-D4D2-4B7F-8A4F-CB6A0928FF09}"/>
+              </a:ext>
+            </a:extLst>
+          </p:cNvPr>
+          <p:cNvPicPr>
+            <a:picLocks noGrp="1" noChangeAspect="1"/>
+          </p:cNvPicPr>
+          <p:nvPr>
+            <p:ph idx="1"/>
+          </p:nvPr>
+        </p:nvPicPr>
+        <p:blipFill rotWithShape="1">
+          <a:blip r:embed="rId2"/>
+          <a:srcRect t="4626" b="2759"/>
+          <a:stretch/>
+        </p:blipFill>
+        <p:spPr>
+          <a:xfrm>
+            <a:off x="1947706" y="1825625"/>
+            <a:ext cx="8296588" cy="4351338"/>
+          </a:xfrm>
+          <a:prstGeom prst="rect">
+            <a:avLst/>
+          </a:prstGeom>
+        </p:spPr>
+      </p:pic>
+    </p:spTree>
+    <p:extLst>
+      <p:ext uri="{BB962C8B-B14F-4D97-AF65-F5344CB8AC3E}">
+        <p14:creationId xmlns:p14="http://schemas.microsoft.com/office/powerpoint/2010/main" val="57732059"/>
+      </p:ext>
+    </p:extLst>
+  </p:cSld>
+  <p:clrMapOvr>
+    <a:masterClrMapping/>
+  </p:clrMapOvr>
+</p:sld>
+</file>
+
 <file path=ppt/theme/theme1.xml><?xml version="1.0" encoding="utf-8"?>
 <a:theme xmlns:a="http://schemas.openxmlformats.org/drawingml/2006/main" name="Office Theme">
   <a:themeElements>

</xml_diff>